<commit_message>
Modify rhythm star.pptx By Daol
</commit_message>
<xml_diff>
--- a/rhythm star.pptx
+++ b/rhythm star.pptx
@@ -6,7 +6,9 @@
   </p:sldMasterIdLst>
   <p:sldIdLst>
     <p:sldId id="256" r:id="rId2"/>
-    <p:sldId id="257" r:id="rId3"/>
+    <p:sldId id="258" r:id="rId3"/>
+    <p:sldId id="259" r:id="rId4"/>
+    <p:sldId id="257" r:id="rId5"/>
   </p:sldIdLst>
   <p:sldSz cx="12192000" cy="6858000"/>
   <p:notesSz cx="6858000" cy="9144000"/>
@@ -105,6 +107,11 @@
       </a:defRPr>
     </a:lvl9pPr>
   </p:defaultTextStyle>
+  <p:extLst>
+    <p:ext uri="{EFAFB233-063F-42B5-8137-9DF3F51BA10A}">
+      <p15:sldGuideLst xmlns:p15="http://schemas.microsoft.com/office/powerpoint/2012/main"/>
+    </p:ext>
+  </p:extLst>
 </p:presentation>
 </file>
 
@@ -3035,6 +3042,410 @@
       </p:grpSpPr>
       <p:sp>
         <p:nvSpPr>
+          <p:cNvPr id="2" name="제목 1"/>
+          <p:cNvSpPr>
+            <a:spLocks noGrp="1"/>
+          </p:cNvSpPr>
+          <p:nvPr>
+            <p:ph type="title"/>
+          </p:nvPr>
+        </p:nvSpPr>
+        <p:spPr/>
+        <p:txBody>
+          <a:bodyPr/>
+          <a:lstStyle/>
+          <a:p>
+            <a:r>
+              <a:rPr lang="ko-KR" altLang="en-US" dirty="0" smtClean="0"/>
+              <a:t>플레이 화면 </a:t>
+            </a:r>
+            <a:r>
+              <a:rPr lang="en-US" altLang="ko-KR" dirty="0" smtClean="0"/>
+              <a:t>– </a:t>
+            </a:r>
+            <a:r>
+              <a:rPr lang="ko-KR" altLang="en-US" dirty="0" smtClean="0"/>
+              <a:t>다올</a:t>
+            </a:r>
+            <a:r>
+              <a:rPr lang="en-US" altLang="ko-KR" dirty="0" smtClean="0"/>
+              <a:t>, </a:t>
+            </a:r>
+            <a:r>
+              <a:rPr lang="ko-KR" altLang="en-US" dirty="0" smtClean="0"/>
+              <a:t>원희</a:t>
+            </a:r>
+            <a:endParaRPr lang="ko-KR" altLang="en-US" dirty="0"/>
+          </a:p>
+        </p:txBody>
+      </p:sp>
+      <p:sp>
+        <p:nvSpPr>
+          <p:cNvPr id="3" name="내용 개체 틀 2"/>
+          <p:cNvSpPr>
+            <a:spLocks noGrp="1"/>
+          </p:cNvSpPr>
+          <p:nvPr>
+            <p:ph idx="1"/>
+          </p:nvPr>
+        </p:nvSpPr>
+        <p:spPr/>
+        <p:txBody>
+          <a:bodyPr/>
+          <a:lstStyle/>
+          <a:p>
+            <a:r>
+              <a:rPr lang="ko-KR" altLang="en-US" dirty="0" err="1"/>
+              <a:t>숏노트</a:t>
+            </a:r>
+            <a:r>
+              <a:rPr lang="ko-KR" altLang="en-US" dirty="0"/>
+              <a:t> </a:t>
+            </a:r>
+            <a:r>
+              <a:rPr lang="en-US" altLang="ko-KR" dirty="0"/>
+              <a:t>- </a:t>
+            </a:r>
+            <a:r>
+              <a:rPr lang="ko-KR" altLang="en-US" b="1" dirty="0"/>
+              <a:t>노란색</a:t>
+            </a:r>
+            <a:r>
+              <a:rPr lang="ko-KR" altLang="en-US" dirty="0"/>
+              <a:t>  </a:t>
+            </a:r>
+            <a:r>
+              <a:rPr lang="en-US" altLang="ko-KR" dirty="0"/>
+              <a:t>/ </a:t>
+            </a:r>
+            <a:r>
+              <a:rPr lang="ko-KR" altLang="en-US" dirty="0"/>
+              <a:t>테두리</a:t>
+            </a:r>
+          </a:p>
+          <a:p>
+            <a:r>
+              <a:rPr lang="ko-KR" altLang="en-US" dirty="0" err="1"/>
+              <a:t>롱노트</a:t>
+            </a:r>
+            <a:r>
+              <a:rPr lang="ko-KR" altLang="en-US" dirty="0"/>
+              <a:t> </a:t>
+            </a:r>
+            <a:r>
+              <a:rPr lang="en-US" altLang="ko-KR" dirty="0"/>
+              <a:t>- </a:t>
+            </a:r>
+            <a:r>
+              <a:rPr lang="ko-KR" altLang="en-US" dirty="0" err="1"/>
+              <a:t>그라데이션</a:t>
+            </a:r>
+            <a:r>
+              <a:rPr lang="ko-KR" altLang="en-US" dirty="0"/>
+              <a:t> </a:t>
+            </a:r>
+            <a:r>
+              <a:rPr lang="en-US" altLang="ko-KR" dirty="0"/>
+              <a:t>/ </a:t>
+            </a:r>
+            <a:r>
+              <a:rPr lang="ko-KR" altLang="en-US" dirty="0"/>
+              <a:t>테두리</a:t>
+            </a:r>
+          </a:p>
+          <a:p>
+            <a:endParaRPr lang="ko-KR" altLang="en-US" dirty="0"/>
+          </a:p>
+          <a:p>
+            <a:r>
+              <a:rPr lang="ko-KR" altLang="en-US" dirty="0"/>
+              <a:t>라인에 노트가 정확히 들어오면 </a:t>
+            </a:r>
+            <a:r>
+              <a:rPr lang="ko-KR" altLang="en-US" dirty="0" err="1"/>
+              <a:t>퍼펙</a:t>
+            </a:r>
+            <a:endParaRPr lang="ko-KR" altLang="en-US" dirty="0"/>
+          </a:p>
+          <a:p>
+            <a:r>
+              <a:rPr lang="ko-KR" altLang="en-US" dirty="0"/>
+              <a:t>라인에 노트가 걸치면 굿</a:t>
+            </a:r>
+          </a:p>
+          <a:p>
+            <a:r>
+              <a:rPr lang="ko-KR" altLang="en-US" dirty="0"/>
+              <a:t>라인에 노트가 근접하면 </a:t>
+            </a:r>
+            <a:r>
+              <a:rPr lang="ko-KR" altLang="en-US" dirty="0" err="1"/>
+              <a:t>노말</a:t>
+            </a:r>
+            <a:endParaRPr lang="ko-KR" altLang="en-US" dirty="0"/>
+          </a:p>
+          <a:p>
+            <a:r>
+              <a:rPr lang="ko-KR" altLang="en-US" dirty="0"/>
+              <a:t>라인에 노트가 벗어나면 </a:t>
+            </a:r>
+            <a:r>
+              <a:rPr lang="ko-KR" altLang="en-US" dirty="0" err="1"/>
+              <a:t>배드</a:t>
+            </a:r>
+            <a:endParaRPr lang="ko-KR" altLang="en-US" dirty="0"/>
+          </a:p>
+        </p:txBody>
+      </p:sp>
+    </p:spTree>
+    <p:extLst>
+      <p:ext uri="{BB962C8B-B14F-4D97-AF65-F5344CB8AC3E}">
+        <p14:creationId xmlns:p14="http://schemas.microsoft.com/office/powerpoint/2010/main" val="2785660368"/>
+      </p:ext>
+    </p:extLst>
+  </p:cSld>
+  <p:clrMapOvr>
+    <a:masterClrMapping/>
+  </p:clrMapOvr>
+</p:sld>
+</file>
+
+<file path=ppt/slides/slide3.xml><?xml version="1.0" encoding="utf-8"?>
+<p:sld xmlns:a="http://schemas.openxmlformats.org/drawingml/2006/main" xmlns:r="http://schemas.openxmlformats.org/officeDocument/2006/relationships" xmlns:p="http://schemas.openxmlformats.org/presentationml/2006/main">
+  <p:cSld>
+    <p:spTree>
+      <p:nvGrpSpPr>
+        <p:cNvPr id="1" name=""/>
+        <p:cNvGrpSpPr/>
+        <p:nvPr/>
+      </p:nvGrpSpPr>
+      <p:grpSpPr>
+        <a:xfrm>
+          <a:off x="0" y="0"/>
+          <a:ext cx="0" cy="0"/>
+          <a:chOff x="0" y="0"/>
+          <a:chExt cx="0" cy="0"/>
+        </a:xfrm>
+      </p:grpSpPr>
+      <p:sp>
+        <p:nvSpPr>
+          <p:cNvPr id="2" name="제목 1"/>
+          <p:cNvSpPr>
+            <a:spLocks noGrp="1"/>
+          </p:cNvSpPr>
+          <p:nvPr>
+            <p:ph type="title"/>
+          </p:nvPr>
+        </p:nvSpPr>
+        <p:spPr/>
+        <p:txBody>
+          <a:bodyPr/>
+          <a:lstStyle/>
+          <a:p>
+            <a:r>
+              <a:rPr lang="ko-KR" altLang="en-US" dirty="0"/>
+              <a:t>플레이 </a:t>
+            </a:r>
+            <a:r>
+              <a:rPr lang="ko-KR" altLang="en-US" dirty="0" smtClean="0"/>
+              <a:t>화면 </a:t>
+            </a:r>
+            <a:r>
+              <a:rPr lang="ko-KR" altLang="en-US" dirty="0" err="1" smtClean="0"/>
+              <a:t>부가사항</a:t>
+            </a:r>
+            <a:r>
+              <a:rPr lang="en-US" altLang="ko-KR" dirty="0" smtClean="0"/>
+              <a:t> </a:t>
+            </a:r>
+            <a:r>
+              <a:rPr lang="en-US" altLang="ko-KR" dirty="0"/>
+              <a:t>– </a:t>
+            </a:r>
+            <a:r>
+              <a:rPr lang="ko-KR" altLang="en-US" dirty="0"/>
+              <a:t>다올</a:t>
+            </a:r>
+            <a:r>
+              <a:rPr lang="en-US" altLang="ko-KR" dirty="0"/>
+              <a:t>, </a:t>
+            </a:r>
+            <a:r>
+              <a:rPr lang="ko-KR" altLang="en-US" dirty="0"/>
+              <a:t>원희</a:t>
+            </a:r>
+          </a:p>
+        </p:txBody>
+      </p:sp>
+      <p:sp>
+        <p:nvSpPr>
+          <p:cNvPr id="3" name="내용 개체 틀 2"/>
+          <p:cNvSpPr>
+            <a:spLocks noGrp="1"/>
+          </p:cNvSpPr>
+          <p:nvPr>
+            <p:ph idx="1"/>
+          </p:nvPr>
+        </p:nvSpPr>
+        <p:spPr/>
+        <p:txBody>
+          <a:bodyPr/>
+          <a:lstStyle/>
+          <a:p>
+            <a:r>
+              <a:rPr lang="ko-KR" altLang="en-US" dirty="0"/>
+              <a:t>콤보 </a:t>
+            </a:r>
+            <a:r>
+              <a:rPr lang="en-US" altLang="ko-KR" dirty="0"/>
+              <a:t>- ?</a:t>
+            </a:r>
+            <a:r>
+              <a:rPr lang="ko-KR" altLang="en-US" dirty="0" err="1"/>
+              <a:t>콤보마다</a:t>
+            </a:r>
+            <a:r>
+              <a:rPr lang="ko-KR" altLang="en-US" dirty="0"/>
+              <a:t> 효과 </a:t>
+            </a:r>
+            <a:r>
+              <a:rPr lang="en-US" altLang="ko-KR" dirty="0"/>
+              <a:t>/ </a:t>
+            </a:r>
+            <a:r>
+              <a:rPr lang="ko-KR" altLang="en-US" dirty="0" err="1"/>
+              <a:t>롱노트</a:t>
+            </a:r>
+            <a:r>
+              <a:rPr lang="ko-KR" altLang="en-US" dirty="0"/>
+              <a:t> 콤보 판정 추가</a:t>
+            </a:r>
+          </a:p>
+          <a:p>
+            <a:endParaRPr lang="ko-KR" altLang="en-US" dirty="0"/>
+          </a:p>
+          <a:p>
+            <a:r>
+              <a:rPr lang="ko-KR" altLang="en-US" dirty="0"/>
+              <a:t>체력 </a:t>
+            </a:r>
+            <a:r>
+              <a:rPr lang="en-US" altLang="ko-KR" dirty="0"/>
+              <a:t>- 5</a:t>
+            </a:r>
+            <a:r>
+              <a:rPr lang="ko-KR" altLang="en-US" dirty="0"/>
+              <a:t>칸 </a:t>
+            </a:r>
+            <a:r>
+              <a:rPr lang="en-US" altLang="ko-KR" dirty="0"/>
+              <a:t>- 1</a:t>
+            </a:r>
+            <a:r>
+              <a:rPr lang="ko-KR" altLang="en-US" dirty="0"/>
+              <a:t>칸당 노트 </a:t>
+            </a:r>
+            <a:r>
+              <a:rPr lang="en-US" altLang="ko-KR" dirty="0"/>
+              <a:t>2</a:t>
+            </a:r>
+            <a:r>
+              <a:rPr lang="ko-KR" altLang="en-US" dirty="0"/>
+              <a:t>개 </a:t>
+            </a:r>
+            <a:r>
+              <a:rPr lang="en-US" altLang="ko-KR" dirty="0"/>
+              <a:t>- </a:t>
+            </a:r>
+            <a:r>
+              <a:rPr lang="ko-KR" altLang="en-US" dirty="0"/>
+              <a:t>총 </a:t>
+            </a:r>
+            <a:r>
+              <a:rPr lang="en-US" altLang="ko-KR" dirty="0"/>
+              <a:t>10</a:t>
+            </a:r>
+            <a:r>
+              <a:rPr lang="ko-KR" altLang="en-US" dirty="0"/>
+              <a:t>회 </a:t>
+            </a:r>
+            <a:r>
+              <a:rPr lang="en-US" altLang="ko-KR" dirty="0"/>
+              <a:t>-&gt; </a:t>
+            </a:r>
+            <a:r>
+              <a:rPr lang="ko-KR" altLang="en-US" dirty="0"/>
+              <a:t>사망</a:t>
+            </a:r>
+          </a:p>
+          <a:p>
+            <a:endParaRPr lang="ko-KR" altLang="en-US" dirty="0"/>
+          </a:p>
+          <a:p>
+            <a:r>
+              <a:rPr lang="ko-KR" altLang="en-US" dirty="0"/>
+              <a:t>노트 </a:t>
+            </a:r>
+            <a:r>
+              <a:rPr lang="ko-KR" altLang="en-US" dirty="0" err="1"/>
+              <a:t>판정시마다</a:t>
+            </a:r>
+            <a:r>
+              <a:rPr lang="ko-KR" altLang="en-US" dirty="0"/>
+              <a:t> </a:t>
+            </a:r>
+            <a:r>
+              <a:rPr lang="ko-KR" altLang="en-US" dirty="0" err="1"/>
+              <a:t>히트라이트닝</a:t>
+            </a:r>
+            <a:r>
+              <a:rPr lang="ko-KR" altLang="en-US" dirty="0"/>
+              <a:t> 효과</a:t>
+            </a:r>
+          </a:p>
+          <a:p>
+            <a:endParaRPr lang="ko-KR" altLang="en-US" dirty="0"/>
+          </a:p>
+          <a:p>
+            <a:r>
+              <a:rPr lang="ko-KR" altLang="en-US" dirty="0"/>
+              <a:t>곡 진행도</a:t>
+            </a:r>
+          </a:p>
+        </p:txBody>
+      </p:sp>
+    </p:spTree>
+    <p:extLst>
+      <p:ext uri="{BB962C8B-B14F-4D97-AF65-F5344CB8AC3E}">
+        <p14:creationId xmlns:p14="http://schemas.microsoft.com/office/powerpoint/2010/main" val="760801195"/>
+      </p:ext>
+    </p:extLst>
+  </p:cSld>
+  <p:clrMapOvr>
+    <a:masterClrMapping/>
+  </p:clrMapOvr>
+</p:sld>
+</file>
+
+<file path=ppt/slides/slide4.xml><?xml version="1.0" encoding="utf-8"?>
+<p:sld xmlns:a="http://schemas.openxmlformats.org/drawingml/2006/main" xmlns:r="http://schemas.openxmlformats.org/officeDocument/2006/relationships" xmlns:p="http://schemas.openxmlformats.org/presentationml/2006/main">
+  <p:cSld>
+    <p:spTree>
+      <p:nvGrpSpPr>
+        <p:cNvPr id="1" name=""/>
+        <p:cNvGrpSpPr/>
+        <p:nvPr/>
+      </p:nvGrpSpPr>
+      <p:grpSpPr>
+        <a:xfrm>
+          <a:off x="0" y="0"/>
+          <a:ext cx="0" cy="0"/>
+          <a:chOff x="0" y="0"/>
+          <a:chExt cx="0" cy="0"/>
+        </a:xfrm>
+      </p:grpSpPr>
+      <p:sp>
+        <p:nvSpPr>
           <p:cNvPr id="2" name="직사각형 1"/>
           <p:cNvSpPr/>
           <p:nvPr/>

</xml_diff>

<commit_message>
Update rhythm_stat.pptx by Taehyung
</commit_message>
<xml_diff>
--- a/rhythm star.pptx
+++ b/rhythm star.pptx
@@ -6,9 +6,11 @@
   </p:sldMasterIdLst>
   <p:sldIdLst>
     <p:sldId id="256" r:id="rId2"/>
-    <p:sldId id="258" r:id="rId3"/>
-    <p:sldId id="259" r:id="rId4"/>
-    <p:sldId id="257" r:id="rId5"/>
+    <p:sldId id="260" r:id="rId3"/>
+    <p:sldId id="258" r:id="rId4"/>
+    <p:sldId id="259" r:id="rId5"/>
+    <p:sldId id="257" r:id="rId6"/>
+    <p:sldId id="261" r:id="rId7"/>
   </p:sldIdLst>
   <p:sldSz cx="12192000" cy="6858000"/>
   <p:notesSz cx="6858000" cy="9144000"/>
@@ -2987,26 +2989,19 @@
           <a:bodyPr/>
           <a:lstStyle/>
           <a:p>
-            <a:endParaRPr lang="ko-KR" altLang="en-US"/>
-          </a:p>
-        </p:txBody>
-      </p:sp>
-      <p:sp>
-        <p:nvSpPr>
-          <p:cNvPr id="3" name="부제목 2"/>
-          <p:cNvSpPr>
-            <a:spLocks noGrp="1"/>
-          </p:cNvSpPr>
-          <p:nvPr>
-            <p:ph type="subTitle" idx="1"/>
-          </p:nvPr>
-        </p:nvSpPr>
-        <p:spPr/>
-        <p:txBody>
-          <a:bodyPr/>
-          <a:lstStyle/>
-          <a:p>
-            <a:endParaRPr lang="ko-KR" altLang="en-US"/>
+            <a:r>
+              <a:rPr lang="en-US" altLang="ko-KR" dirty="0" smtClean="0"/>
+              <a:t>2</a:t>
+            </a:r>
+            <a:r>
+              <a:rPr lang="ko-KR" altLang="en-US" dirty="0" smtClean="0"/>
+              <a:t>조 </a:t>
+            </a:r>
+            <a:r>
+              <a:rPr lang="ko-KR" altLang="en-US" dirty="0" err="1" smtClean="0"/>
+              <a:t>리듬스타</a:t>
+            </a:r>
+            <a:endParaRPr lang="ko-KR" altLang="en-US" dirty="0"/>
           </a:p>
         </p:txBody>
       </p:sp>
@@ -3042,156 +3037,400 @@
       </p:grpSpPr>
       <p:sp>
         <p:nvSpPr>
-          <p:cNvPr id="2" name="제목 1"/>
-          <p:cNvSpPr>
-            <a:spLocks noGrp="1"/>
-          </p:cNvSpPr>
-          <p:nvPr>
-            <p:ph type="title"/>
-          </p:nvPr>
-        </p:nvSpPr>
-        <p:spPr/>
+          <p:cNvPr id="3" name="제목 3"/>
+          <p:cNvSpPr txBox="1">
+            <a:spLocks/>
+          </p:cNvSpPr>
+          <p:nvPr/>
+        </p:nvSpPr>
+        <p:spPr>
+          <a:xfrm>
+            <a:off x="838200" y="365125"/>
+            <a:ext cx="10515600" cy="1325563"/>
+          </a:xfrm>
+          <a:prstGeom prst="rect">
+            <a:avLst/>
+          </a:prstGeom>
+        </p:spPr>
         <p:txBody>
           <a:bodyPr/>
-          <a:lstStyle/>
-          <a:p>
-            <a:r>
-              <a:rPr lang="ko-KR" altLang="en-US" dirty="0" smtClean="0"/>
-              <a:t>플레이 화면 </a:t>
-            </a:r>
-            <a:r>
-              <a:rPr lang="en-US" altLang="ko-KR" dirty="0" smtClean="0"/>
-              <a:t>– </a:t>
-            </a:r>
-            <a:r>
-              <a:rPr lang="ko-KR" altLang="en-US" dirty="0" smtClean="0"/>
-              <a:t>다올</a:t>
-            </a:r>
-            <a:r>
-              <a:rPr lang="en-US" altLang="ko-KR" dirty="0" smtClean="0"/>
+          <a:lstStyle>
+            <a:lvl1pPr algn="l" defTabSz="914400" rtl="0" eaLnBrk="1" latinLnBrk="1" hangingPunct="1">
+              <a:lnSpc>
+                <a:spcPct val="90000"/>
+              </a:lnSpc>
+              <a:spcBef>
+                <a:spcPct val="0"/>
+              </a:spcBef>
+              <a:buNone/>
+              <a:defRPr sz="4400" kern="1200">
+                <a:solidFill>
+                  <a:schemeClr val="tx1"/>
+                </a:solidFill>
+                <a:latin typeface="+mj-lt"/>
+                <a:ea typeface="+mj-ea"/>
+                <a:cs typeface="+mj-cs"/>
+              </a:defRPr>
+            </a:lvl1pPr>
+          </a:lstStyle>
+          <a:p>
+            <a:r>
+              <a:rPr lang="ko-KR" altLang="en-US" smtClean="0"/>
+              <a:t>역할</a:t>
+            </a:r>
+            <a:r>
+              <a:rPr lang="en-US" altLang="ko-KR" smtClean="0"/>
+              <a:t>-</a:t>
+            </a:r>
+            <a:r>
+              <a:rPr lang="ko-KR" altLang="en-US" sz="2000" smtClean="0"/>
+              <a:t>전체적인 틀</a:t>
+            </a:r>
+            <a:r>
+              <a:rPr lang="en-US" altLang="ko-KR" sz="2000" smtClean="0"/>
+              <a:t>,</a:t>
+            </a:r>
+            <a:r>
+              <a:rPr lang="ko-KR" altLang="en-US" sz="2000" smtClean="0"/>
+              <a:t>노래선택</a:t>
+            </a:r>
+            <a:r>
+              <a:rPr lang="en-US" altLang="ko-KR" sz="2000" smtClean="0"/>
+              <a:t>,</a:t>
+            </a:r>
+            <a:r>
+              <a:rPr lang="ko-KR" altLang="en-US" sz="2000" smtClean="0"/>
+              <a:t>노트 맵</a:t>
+            </a:r>
+            <a:r>
+              <a:rPr lang="en-US" altLang="ko-KR" sz="2000" smtClean="0"/>
               <a:t>, </a:t>
             </a:r>
             <a:r>
-              <a:rPr lang="ko-KR" altLang="en-US" dirty="0" smtClean="0"/>
+              <a:rPr lang="ko-KR" altLang="en-US" sz="2000" smtClean="0"/>
+              <a:t>노트</a:t>
+            </a:r>
+            <a:r>
+              <a:rPr lang="en-US" altLang="ko-KR" sz="2000" smtClean="0"/>
+              <a:t>1,2   [</a:t>
+            </a:r>
+            <a:r>
+              <a:rPr lang="ko-KR" altLang="en-US" sz="2000" smtClean="0"/>
+              <a:t>키</a:t>
+            </a:r>
+            <a:r>
+              <a:rPr lang="en-US" altLang="ko-KR" sz="2000" smtClean="0"/>
+              <a:t> </a:t>
+            </a:r>
+            <a:r>
+              <a:rPr lang="ko-KR" altLang="en-US" sz="2000" smtClean="0"/>
+              <a:t>설정 변경</a:t>
+            </a:r>
+            <a:r>
+              <a:rPr lang="en-US" altLang="ko-KR" sz="2000" smtClean="0"/>
+              <a:t>, </a:t>
+            </a:r>
+            <a:r>
+              <a:rPr lang="ko-KR" altLang="en-US" sz="2000" smtClean="0"/>
+              <a:t>랭킹</a:t>
+            </a:r>
+            <a:r>
+              <a:rPr lang="en-US" altLang="ko-KR" sz="2000" smtClean="0"/>
+              <a:t>]</a:t>
+            </a:r>
+            <a:endParaRPr lang="ko-KR" altLang="en-US" sz="2000" dirty="0"/>
+          </a:p>
+        </p:txBody>
+      </p:sp>
+      <p:sp>
+        <p:nvSpPr>
+          <p:cNvPr id="4" name="내용 개체 틀 2"/>
+          <p:cNvSpPr txBox="1">
+            <a:spLocks/>
+          </p:cNvSpPr>
+          <p:nvPr/>
+        </p:nvSpPr>
+        <p:spPr>
+          <a:xfrm>
+            <a:off x="838200" y="1825625"/>
+            <a:ext cx="10515600" cy="4351338"/>
+          </a:xfrm>
+          <a:prstGeom prst="rect">
+            <a:avLst/>
+          </a:prstGeom>
+        </p:spPr>
+        <p:txBody>
+          <a:bodyPr>
+            <a:normAutofit lnSpcReduction="10000"/>
+          </a:bodyPr>
+          <a:lstStyle>
+            <a:lvl1pPr marL="228600" indent="-228600" algn="l" defTabSz="914400" rtl="0" eaLnBrk="1" latinLnBrk="1" hangingPunct="1">
+              <a:lnSpc>
+                <a:spcPct val="90000"/>
+              </a:lnSpc>
+              <a:spcBef>
+                <a:spcPts val="1000"/>
+              </a:spcBef>
+              <a:buFont typeface="Arial" panose="020B0604020202020204" pitchFamily="34" charset="0"/>
+              <a:buChar char="•"/>
+              <a:defRPr sz="2800" kern="1200">
+                <a:solidFill>
+                  <a:schemeClr val="tx1"/>
+                </a:solidFill>
+                <a:latin typeface="+mn-lt"/>
+                <a:ea typeface="+mn-ea"/>
+                <a:cs typeface="+mn-cs"/>
+              </a:defRPr>
+            </a:lvl1pPr>
+            <a:lvl2pPr marL="685800" indent="-228600" algn="l" defTabSz="914400" rtl="0" eaLnBrk="1" latinLnBrk="1" hangingPunct="1">
+              <a:lnSpc>
+                <a:spcPct val="90000"/>
+              </a:lnSpc>
+              <a:spcBef>
+                <a:spcPts val="500"/>
+              </a:spcBef>
+              <a:buFont typeface="Arial" panose="020B0604020202020204" pitchFamily="34" charset="0"/>
+              <a:buChar char="•"/>
+              <a:defRPr sz="2400" kern="1200">
+                <a:solidFill>
+                  <a:schemeClr val="tx1"/>
+                </a:solidFill>
+                <a:latin typeface="+mn-lt"/>
+                <a:ea typeface="+mn-ea"/>
+                <a:cs typeface="+mn-cs"/>
+              </a:defRPr>
+            </a:lvl2pPr>
+            <a:lvl3pPr marL="1143000" indent="-228600" algn="l" defTabSz="914400" rtl="0" eaLnBrk="1" latinLnBrk="1" hangingPunct="1">
+              <a:lnSpc>
+                <a:spcPct val="90000"/>
+              </a:lnSpc>
+              <a:spcBef>
+                <a:spcPts val="500"/>
+              </a:spcBef>
+              <a:buFont typeface="Arial" panose="020B0604020202020204" pitchFamily="34" charset="0"/>
+              <a:buChar char="•"/>
+              <a:defRPr sz="2000" kern="1200">
+                <a:solidFill>
+                  <a:schemeClr val="tx1"/>
+                </a:solidFill>
+                <a:latin typeface="+mn-lt"/>
+                <a:ea typeface="+mn-ea"/>
+                <a:cs typeface="+mn-cs"/>
+              </a:defRPr>
+            </a:lvl3pPr>
+            <a:lvl4pPr marL="1600200" indent="-228600" algn="l" defTabSz="914400" rtl="0" eaLnBrk="1" latinLnBrk="1" hangingPunct="1">
+              <a:lnSpc>
+                <a:spcPct val="90000"/>
+              </a:lnSpc>
+              <a:spcBef>
+                <a:spcPts val="500"/>
+              </a:spcBef>
+              <a:buFont typeface="Arial" panose="020B0604020202020204" pitchFamily="34" charset="0"/>
+              <a:buChar char="•"/>
+              <a:defRPr sz="1800" kern="1200">
+                <a:solidFill>
+                  <a:schemeClr val="tx1"/>
+                </a:solidFill>
+                <a:latin typeface="+mn-lt"/>
+                <a:ea typeface="+mn-ea"/>
+                <a:cs typeface="+mn-cs"/>
+              </a:defRPr>
+            </a:lvl4pPr>
+            <a:lvl5pPr marL="2057400" indent="-228600" algn="l" defTabSz="914400" rtl="0" eaLnBrk="1" latinLnBrk="1" hangingPunct="1">
+              <a:lnSpc>
+                <a:spcPct val="90000"/>
+              </a:lnSpc>
+              <a:spcBef>
+                <a:spcPts val="500"/>
+              </a:spcBef>
+              <a:buFont typeface="Arial" panose="020B0604020202020204" pitchFamily="34" charset="0"/>
+              <a:buChar char="•"/>
+              <a:defRPr sz="1800" kern="1200">
+                <a:solidFill>
+                  <a:schemeClr val="tx1"/>
+                </a:solidFill>
+                <a:latin typeface="+mn-lt"/>
+                <a:ea typeface="+mn-ea"/>
+                <a:cs typeface="+mn-cs"/>
+              </a:defRPr>
+            </a:lvl5pPr>
+            <a:lvl6pPr marL="2514600" indent="-228600" algn="l" defTabSz="914400" rtl="0" eaLnBrk="1" latinLnBrk="1" hangingPunct="1">
+              <a:lnSpc>
+                <a:spcPct val="90000"/>
+              </a:lnSpc>
+              <a:spcBef>
+                <a:spcPts val="500"/>
+              </a:spcBef>
+              <a:buFont typeface="Arial" panose="020B0604020202020204" pitchFamily="34" charset="0"/>
+              <a:buChar char="•"/>
+              <a:defRPr sz="1800" kern="1200">
+                <a:solidFill>
+                  <a:schemeClr val="tx1"/>
+                </a:solidFill>
+                <a:latin typeface="+mn-lt"/>
+                <a:ea typeface="+mn-ea"/>
+                <a:cs typeface="+mn-cs"/>
+              </a:defRPr>
+            </a:lvl6pPr>
+            <a:lvl7pPr marL="2971800" indent="-228600" algn="l" defTabSz="914400" rtl="0" eaLnBrk="1" latinLnBrk="1" hangingPunct="1">
+              <a:lnSpc>
+                <a:spcPct val="90000"/>
+              </a:lnSpc>
+              <a:spcBef>
+                <a:spcPts val="500"/>
+              </a:spcBef>
+              <a:buFont typeface="Arial" panose="020B0604020202020204" pitchFamily="34" charset="0"/>
+              <a:buChar char="•"/>
+              <a:defRPr sz="1800" kern="1200">
+                <a:solidFill>
+                  <a:schemeClr val="tx1"/>
+                </a:solidFill>
+                <a:latin typeface="+mn-lt"/>
+                <a:ea typeface="+mn-ea"/>
+                <a:cs typeface="+mn-cs"/>
+              </a:defRPr>
+            </a:lvl7pPr>
+            <a:lvl8pPr marL="3429000" indent="-228600" algn="l" defTabSz="914400" rtl="0" eaLnBrk="1" latinLnBrk="1" hangingPunct="1">
+              <a:lnSpc>
+                <a:spcPct val="90000"/>
+              </a:lnSpc>
+              <a:spcBef>
+                <a:spcPts val="500"/>
+              </a:spcBef>
+              <a:buFont typeface="Arial" panose="020B0604020202020204" pitchFamily="34" charset="0"/>
+              <a:buChar char="•"/>
+              <a:defRPr sz="1800" kern="1200">
+                <a:solidFill>
+                  <a:schemeClr val="tx1"/>
+                </a:solidFill>
+                <a:latin typeface="+mn-lt"/>
+                <a:ea typeface="+mn-ea"/>
+                <a:cs typeface="+mn-cs"/>
+              </a:defRPr>
+            </a:lvl8pPr>
+            <a:lvl9pPr marL="3886200" indent="-228600" algn="l" defTabSz="914400" rtl="0" eaLnBrk="1" latinLnBrk="1" hangingPunct="1">
+              <a:lnSpc>
+                <a:spcPct val="90000"/>
+              </a:lnSpc>
+              <a:spcBef>
+                <a:spcPts val="500"/>
+              </a:spcBef>
+              <a:buFont typeface="Arial" panose="020B0604020202020204" pitchFamily="34" charset="0"/>
+              <a:buChar char="•"/>
+              <a:defRPr sz="1800" kern="1200">
+                <a:solidFill>
+                  <a:schemeClr val="tx1"/>
+                </a:solidFill>
+                <a:latin typeface="+mn-lt"/>
+                <a:ea typeface="+mn-ea"/>
+                <a:cs typeface="+mn-cs"/>
+              </a:defRPr>
+            </a:lvl9pPr>
+          </a:lstStyle>
+          <a:p>
+            <a:r>
+              <a:rPr lang="ko-KR" altLang="en-US" smtClean="0"/>
+              <a:t>민조</a:t>
+            </a:r>
+            <a:r>
+              <a:rPr lang="en-US" altLang="ko-KR" smtClean="0"/>
+              <a:t>-</a:t>
+            </a:r>
+            <a:r>
+              <a:rPr lang="ko-KR" altLang="en-US" smtClean="0"/>
+              <a:t>전체적인 틀</a:t>
+            </a:r>
+            <a:r>
+              <a:rPr lang="en-US" altLang="ko-KR" smtClean="0"/>
+              <a:t>(</a:t>
+            </a:r>
+            <a:r>
+              <a:rPr lang="ko-KR" altLang="en-US" smtClean="0"/>
+              <a:t>보조 노트 맵</a:t>
+            </a:r>
+            <a:r>
+              <a:rPr lang="en-US" altLang="ko-KR" smtClean="0"/>
+              <a:t>)</a:t>
+            </a:r>
+          </a:p>
+          <a:p>
+            <a:endParaRPr lang="en-US" altLang="ko-KR" smtClean="0"/>
+          </a:p>
+          <a:p>
+            <a:r>
+              <a:rPr lang="ko-KR" altLang="en-US" smtClean="0"/>
+              <a:t>태형</a:t>
+            </a:r>
+            <a:r>
+              <a:rPr lang="en-US" altLang="ko-KR" smtClean="0"/>
+              <a:t>-</a:t>
+            </a:r>
+            <a:r>
+              <a:rPr lang="ko-KR" altLang="en-US" smtClean="0"/>
+              <a:t>노래선택 </a:t>
+            </a:r>
+            <a:r>
+              <a:rPr lang="en-US" altLang="ko-KR" smtClean="0"/>
+              <a:t>(</a:t>
+            </a:r>
+            <a:r>
+              <a:rPr lang="ko-KR" altLang="en-US" smtClean="0"/>
+              <a:t>보조 </a:t>
+            </a:r>
+            <a:r>
+              <a:rPr lang="en-US" altLang="ko-KR" smtClean="0"/>
+              <a:t>)</a:t>
+            </a:r>
+          </a:p>
+          <a:p>
+            <a:endParaRPr lang="en-US" altLang="ko-KR" smtClean="0"/>
+          </a:p>
+          <a:p>
+            <a:r>
+              <a:rPr lang="ko-KR" altLang="en-US" smtClean="0"/>
+              <a:t>다올-노트 </a:t>
+            </a:r>
+            <a:r>
+              <a:rPr lang="en-US" altLang="ko-KR" smtClean="0"/>
+              <a:t>1</a:t>
+            </a:r>
+          </a:p>
+          <a:p>
+            <a:endParaRPr lang="en-US" altLang="ko-KR" smtClean="0"/>
+          </a:p>
+          <a:p>
+            <a:r>
+              <a:rPr lang="ko-KR" altLang="en-US" smtClean="0"/>
               <a:t>원희</a:t>
             </a:r>
-            <a:endParaRPr lang="ko-KR" altLang="en-US" dirty="0"/>
-          </a:p>
-        </p:txBody>
-      </p:sp>
-      <p:sp>
-        <p:nvSpPr>
-          <p:cNvPr id="3" name="내용 개체 틀 2"/>
-          <p:cNvSpPr>
-            <a:spLocks noGrp="1"/>
-          </p:cNvSpPr>
-          <p:nvPr>
-            <p:ph idx="1"/>
-          </p:nvPr>
-        </p:nvSpPr>
-        <p:spPr/>
-        <p:txBody>
-          <a:bodyPr/>
-          <a:lstStyle/>
-          <a:p>
-            <a:r>
-              <a:rPr lang="ko-KR" altLang="en-US" dirty="0" err="1"/>
-              <a:t>숏노트</a:t>
-            </a:r>
-            <a:r>
-              <a:rPr lang="ko-KR" altLang="en-US" dirty="0"/>
-              <a:t> </a:t>
-            </a:r>
-            <a:r>
-              <a:rPr lang="en-US" altLang="ko-KR" dirty="0"/>
-              <a:t>- </a:t>
-            </a:r>
-            <a:r>
-              <a:rPr lang="ko-KR" altLang="en-US" b="1" dirty="0"/>
-              <a:t>노란색</a:t>
-            </a:r>
-            <a:r>
-              <a:rPr lang="ko-KR" altLang="en-US" dirty="0"/>
-              <a:t>  </a:t>
-            </a:r>
-            <a:r>
-              <a:rPr lang="en-US" altLang="ko-KR" dirty="0"/>
-              <a:t>/ </a:t>
-            </a:r>
-            <a:r>
-              <a:rPr lang="ko-KR" altLang="en-US" dirty="0"/>
-              <a:t>테두리</a:t>
-            </a:r>
-          </a:p>
-          <a:p>
-            <a:r>
-              <a:rPr lang="ko-KR" altLang="en-US" dirty="0" err="1"/>
-              <a:t>롱노트</a:t>
-            </a:r>
-            <a:r>
-              <a:rPr lang="ko-KR" altLang="en-US" dirty="0"/>
-              <a:t> </a:t>
-            </a:r>
-            <a:r>
-              <a:rPr lang="en-US" altLang="ko-KR" dirty="0"/>
-              <a:t>- </a:t>
-            </a:r>
-            <a:r>
-              <a:rPr lang="ko-KR" altLang="en-US" dirty="0" err="1"/>
-              <a:t>그라데이션</a:t>
-            </a:r>
-            <a:r>
-              <a:rPr lang="ko-KR" altLang="en-US" dirty="0"/>
-              <a:t> </a:t>
-            </a:r>
-            <a:r>
-              <a:rPr lang="en-US" altLang="ko-KR" dirty="0"/>
-              <a:t>/ </a:t>
-            </a:r>
-            <a:r>
-              <a:rPr lang="ko-KR" altLang="en-US" dirty="0"/>
-              <a:t>테두리</a:t>
-            </a:r>
-          </a:p>
-          <a:p>
-            <a:endParaRPr lang="ko-KR" altLang="en-US" dirty="0"/>
-          </a:p>
-          <a:p>
-            <a:r>
-              <a:rPr lang="ko-KR" altLang="en-US" dirty="0"/>
-              <a:t>라인에 노트가 정확히 들어오면 </a:t>
-            </a:r>
-            <a:r>
-              <a:rPr lang="ko-KR" altLang="en-US" dirty="0" err="1"/>
-              <a:t>퍼펙</a:t>
-            </a:r>
-            <a:endParaRPr lang="ko-KR" altLang="en-US" dirty="0"/>
-          </a:p>
-          <a:p>
-            <a:r>
-              <a:rPr lang="ko-KR" altLang="en-US" dirty="0"/>
-              <a:t>라인에 노트가 걸치면 굿</a:t>
-            </a:r>
-          </a:p>
-          <a:p>
-            <a:r>
-              <a:rPr lang="ko-KR" altLang="en-US" dirty="0"/>
-              <a:t>라인에 노트가 근접하면 </a:t>
-            </a:r>
-            <a:r>
-              <a:rPr lang="ko-KR" altLang="en-US" dirty="0" err="1"/>
-              <a:t>노말</a:t>
-            </a:r>
-            <a:endParaRPr lang="ko-KR" altLang="en-US" dirty="0"/>
-          </a:p>
-          <a:p>
-            <a:r>
-              <a:rPr lang="ko-KR" altLang="en-US" dirty="0"/>
-              <a:t>라인에 노트가 벗어나면 </a:t>
-            </a:r>
-            <a:r>
-              <a:rPr lang="ko-KR" altLang="en-US" dirty="0" err="1"/>
-              <a:t>배드</a:t>
+            <a:r>
+              <a:rPr lang="en-US" altLang="ko-KR" smtClean="0"/>
+              <a:t>-</a:t>
+            </a:r>
+            <a:r>
+              <a:rPr lang="ko-KR" altLang="en-US" smtClean="0"/>
+              <a:t>노트</a:t>
+            </a:r>
+            <a:r>
+              <a:rPr lang="en-US" altLang="ko-KR" smtClean="0"/>
+              <a:t> 2</a:t>
+            </a:r>
+          </a:p>
+          <a:p>
+            <a:endParaRPr lang="en-US" altLang="ko-KR" smtClean="0"/>
+          </a:p>
+          <a:p>
+            <a:r>
+              <a:rPr lang="ko-KR" altLang="en-US" smtClean="0"/>
+              <a:t>연수</a:t>
+            </a:r>
+            <a:r>
+              <a:rPr lang="en-US" altLang="ko-KR" smtClean="0"/>
+              <a:t>-</a:t>
+            </a:r>
+            <a:r>
+              <a:rPr lang="ko-KR" altLang="en-US" smtClean="0"/>
+              <a:t>노트 맵</a:t>
             </a:r>
             <a:endParaRPr lang="ko-KR" altLang="en-US" dirty="0"/>
           </a:p>
@@ -3200,7 +3439,7 @@
     </p:spTree>
     <p:extLst>
       <p:ext uri="{BB962C8B-B14F-4D97-AF65-F5344CB8AC3E}">
-        <p14:creationId xmlns:p14="http://schemas.microsoft.com/office/powerpoint/2010/main" val="2785660368"/>
+        <p14:creationId xmlns:p14="http://schemas.microsoft.com/office/powerpoint/2010/main" val="292989018"/>
       </p:ext>
     </p:extLst>
   </p:cSld>
@@ -3243,6 +3482,193 @@
           <a:lstStyle/>
           <a:p>
             <a:r>
+              <a:rPr lang="ko-KR" altLang="en-US" dirty="0" smtClean="0"/>
+              <a:t>플레이 화면 </a:t>
+            </a:r>
+            <a:r>
+              <a:rPr lang="en-US" altLang="ko-KR" dirty="0" smtClean="0"/>
+              <a:t>– </a:t>
+            </a:r>
+            <a:r>
+              <a:rPr lang="ko-KR" altLang="en-US" dirty="0" smtClean="0"/>
+              <a:t>다올</a:t>
+            </a:r>
+            <a:r>
+              <a:rPr lang="en-US" altLang="ko-KR" dirty="0" smtClean="0"/>
+              <a:t>, </a:t>
+            </a:r>
+            <a:r>
+              <a:rPr lang="ko-KR" altLang="en-US" dirty="0" smtClean="0"/>
+              <a:t>원희</a:t>
+            </a:r>
+            <a:endParaRPr lang="ko-KR" altLang="en-US" dirty="0"/>
+          </a:p>
+        </p:txBody>
+      </p:sp>
+      <p:sp>
+        <p:nvSpPr>
+          <p:cNvPr id="3" name="내용 개체 틀 2"/>
+          <p:cNvSpPr>
+            <a:spLocks noGrp="1"/>
+          </p:cNvSpPr>
+          <p:nvPr>
+            <p:ph idx="1"/>
+          </p:nvPr>
+        </p:nvSpPr>
+        <p:spPr/>
+        <p:txBody>
+          <a:bodyPr/>
+          <a:lstStyle/>
+          <a:p>
+            <a:r>
+              <a:rPr lang="ko-KR" altLang="en-US" dirty="0" err="1"/>
+              <a:t>숏노트</a:t>
+            </a:r>
+            <a:r>
+              <a:rPr lang="ko-KR" altLang="en-US" dirty="0"/>
+              <a:t> </a:t>
+            </a:r>
+            <a:r>
+              <a:rPr lang="en-US" altLang="ko-KR" dirty="0"/>
+              <a:t>- </a:t>
+            </a:r>
+            <a:r>
+              <a:rPr lang="ko-KR" altLang="en-US" b="1" dirty="0"/>
+              <a:t>노란색</a:t>
+            </a:r>
+            <a:r>
+              <a:rPr lang="ko-KR" altLang="en-US" dirty="0"/>
+              <a:t>  </a:t>
+            </a:r>
+            <a:r>
+              <a:rPr lang="en-US" altLang="ko-KR" dirty="0"/>
+              <a:t>/ </a:t>
+            </a:r>
+            <a:r>
+              <a:rPr lang="ko-KR" altLang="en-US" dirty="0"/>
+              <a:t>테두리</a:t>
+            </a:r>
+          </a:p>
+          <a:p>
+            <a:r>
+              <a:rPr lang="ko-KR" altLang="en-US" dirty="0" err="1"/>
+              <a:t>롱노트</a:t>
+            </a:r>
+            <a:r>
+              <a:rPr lang="ko-KR" altLang="en-US" dirty="0"/>
+              <a:t> </a:t>
+            </a:r>
+            <a:r>
+              <a:rPr lang="en-US" altLang="ko-KR" dirty="0"/>
+              <a:t>- </a:t>
+            </a:r>
+            <a:r>
+              <a:rPr lang="ko-KR" altLang="en-US" dirty="0" err="1"/>
+              <a:t>그라데이션</a:t>
+            </a:r>
+            <a:r>
+              <a:rPr lang="ko-KR" altLang="en-US" dirty="0"/>
+              <a:t> </a:t>
+            </a:r>
+            <a:r>
+              <a:rPr lang="en-US" altLang="ko-KR" dirty="0"/>
+              <a:t>/ </a:t>
+            </a:r>
+            <a:r>
+              <a:rPr lang="ko-KR" altLang="en-US" dirty="0"/>
+              <a:t>테두리</a:t>
+            </a:r>
+          </a:p>
+          <a:p>
+            <a:endParaRPr lang="ko-KR" altLang="en-US" dirty="0"/>
+          </a:p>
+          <a:p>
+            <a:r>
+              <a:rPr lang="ko-KR" altLang="en-US" dirty="0"/>
+              <a:t>라인에 노트가 정확히 들어오면 </a:t>
+            </a:r>
+            <a:r>
+              <a:rPr lang="ko-KR" altLang="en-US" dirty="0" err="1"/>
+              <a:t>퍼펙</a:t>
+            </a:r>
+            <a:endParaRPr lang="ko-KR" altLang="en-US" dirty="0"/>
+          </a:p>
+          <a:p>
+            <a:r>
+              <a:rPr lang="ko-KR" altLang="en-US" dirty="0"/>
+              <a:t>라인에 노트가 걸치면 굿</a:t>
+            </a:r>
+          </a:p>
+          <a:p>
+            <a:r>
+              <a:rPr lang="ko-KR" altLang="en-US" dirty="0"/>
+              <a:t>라인에 노트가 근접하면 </a:t>
+            </a:r>
+            <a:r>
+              <a:rPr lang="ko-KR" altLang="en-US" dirty="0" err="1"/>
+              <a:t>노말</a:t>
+            </a:r>
+            <a:endParaRPr lang="ko-KR" altLang="en-US" dirty="0"/>
+          </a:p>
+          <a:p>
+            <a:r>
+              <a:rPr lang="ko-KR" altLang="en-US" dirty="0"/>
+              <a:t>라인에 노트가 벗어나면 </a:t>
+            </a:r>
+            <a:r>
+              <a:rPr lang="ko-KR" altLang="en-US" dirty="0" err="1"/>
+              <a:t>배드</a:t>
+            </a:r>
+            <a:endParaRPr lang="ko-KR" altLang="en-US" dirty="0"/>
+          </a:p>
+        </p:txBody>
+      </p:sp>
+    </p:spTree>
+    <p:extLst>
+      <p:ext uri="{BB962C8B-B14F-4D97-AF65-F5344CB8AC3E}">
+        <p14:creationId xmlns:p14="http://schemas.microsoft.com/office/powerpoint/2010/main" val="2785660368"/>
+      </p:ext>
+    </p:extLst>
+  </p:cSld>
+  <p:clrMapOvr>
+    <a:masterClrMapping/>
+  </p:clrMapOvr>
+</p:sld>
+</file>
+
+<file path=ppt/slides/slide4.xml><?xml version="1.0" encoding="utf-8"?>
+<p:sld xmlns:a="http://schemas.openxmlformats.org/drawingml/2006/main" xmlns:r="http://schemas.openxmlformats.org/officeDocument/2006/relationships" xmlns:p="http://schemas.openxmlformats.org/presentationml/2006/main">
+  <p:cSld>
+    <p:spTree>
+      <p:nvGrpSpPr>
+        <p:cNvPr id="1" name=""/>
+        <p:cNvGrpSpPr/>
+        <p:nvPr/>
+      </p:nvGrpSpPr>
+      <p:grpSpPr>
+        <a:xfrm>
+          <a:off x="0" y="0"/>
+          <a:ext cx="0" cy="0"/>
+          <a:chOff x="0" y="0"/>
+          <a:chExt cx="0" cy="0"/>
+        </a:xfrm>
+      </p:grpSpPr>
+      <p:sp>
+        <p:nvSpPr>
+          <p:cNvPr id="2" name="제목 1"/>
+          <p:cNvSpPr>
+            <a:spLocks noGrp="1"/>
+          </p:cNvSpPr>
+          <p:nvPr>
+            <p:ph type="title"/>
+          </p:nvPr>
+        </p:nvSpPr>
+        <p:spPr/>
+        <p:txBody>
+          <a:bodyPr/>
+          <a:lstStyle/>
+          <a:p>
+            <a:r>
               <a:rPr lang="ko-KR" altLang="en-US" dirty="0"/>
               <a:t>플레이 </a:t>
             </a:r>
@@ -3427,7 +3853,7 @@
 </p:sld>
 </file>
 
-<file path=ppt/slides/slide4.xml><?xml version="1.0" encoding="utf-8"?>
+<file path=ppt/slides/slide5.xml><?xml version="1.0" encoding="utf-8"?>
 <p:sld xmlns:a="http://schemas.openxmlformats.org/drawingml/2006/main" xmlns:r="http://schemas.openxmlformats.org/officeDocument/2006/relationships" xmlns:p="http://schemas.openxmlformats.org/presentationml/2006/main">
   <p:cSld>
     <p:spTree>
@@ -4235,6 +4661,681 @@
       </p:par>
     </p:tnLst>
   </p:timing>
+</p:sld>
+</file>
+
+<file path=ppt/slides/slide6.xml><?xml version="1.0" encoding="utf-8"?>
+<p:sld xmlns:a="http://schemas.openxmlformats.org/drawingml/2006/main" xmlns:r="http://schemas.openxmlformats.org/officeDocument/2006/relationships" xmlns:p="http://schemas.openxmlformats.org/presentationml/2006/main">
+  <p:cSld>
+    <p:spTree>
+      <p:nvGrpSpPr>
+        <p:cNvPr id="1" name=""/>
+        <p:cNvGrpSpPr/>
+        <p:nvPr/>
+      </p:nvGrpSpPr>
+      <p:grpSpPr>
+        <a:xfrm>
+          <a:off x="0" y="0"/>
+          <a:ext cx="0" cy="0"/>
+          <a:chOff x="0" y="0"/>
+          <a:chExt cx="0" cy="0"/>
+        </a:xfrm>
+      </p:grpSpPr>
+      <p:sp>
+        <p:nvSpPr>
+          <p:cNvPr id="2" name="TextBox 1"/>
+          <p:cNvSpPr txBox="1"/>
+          <p:nvPr/>
+        </p:nvSpPr>
+        <p:spPr>
+          <a:xfrm>
+            <a:off x="2790334" y="612742"/>
+            <a:ext cx="5778631" cy="4468305"/>
+          </a:xfrm>
+          <a:prstGeom prst="rect">
+            <a:avLst/>
+          </a:prstGeom>
+          <a:noFill/>
+        </p:spPr>
+        <p:txBody>
+          <a:bodyPr wrap="square" rtlCol="0">
+            <a:spAutoFit/>
+          </a:bodyPr>
+          <a:lstStyle/>
+          <a:p>
+            <a:endParaRPr lang="ko-KR" altLang="en-US" dirty="0"/>
+          </a:p>
+        </p:txBody>
+      </p:sp>
+      <p:sp>
+        <p:nvSpPr>
+          <p:cNvPr id="3" name="직사각형 2"/>
+          <p:cNvSpPr/>
+          <p:nvPr/>
+        </p:nvSpPr>
+        <p:spPr>
+          <a:xfrm>
+            <a:off x="8531259" y="1932494"/>
+            <a:ext cx="2884602" cy="2978869"/>
+          </a:xfrm>
+          <a:prstGeom prst="rect">
+            <a:avLst/>
+          </a:prstGeom>
+          <a:gradFill flip="none" rotWithShape="1">
+            <a:gsLst>
+              <a:gs pos="0">
+                <a:schemeClr val="lt1">
+                  <a:shade val="30000"/>
+                  <a:satMod val="115000"/>
+                </a:schemeClr>
+              </a:gs>
+              <a:gs pos="50000">
+                <a:schemeClr val="lt1">
+                  <a:shade val="67500"/>
+                  <a:satMod val="115000"/>
+                </a:schemeClr>
+              </a:gs>
+              <a:gs pos="100000">
+                <a:schemeClr val="lt1">
+                  <a:shade val="100000"/>
+                  <a:satMod val="115000"/>
+                </a:schemeClr>
+              </a:gs>
+            </a:gsLst>
+            <a:path path="circle">
+              <a:fillToRect l="50000" t="50000" r="50000" b="50000"/>
+            </a:path>
+            <a:tileRect/>
+          </a:gradFill>
+          <a:ln>
+            <a:prstDash val="dash"/>
+          </a:ln>
+        </p:spPr>
+        <p:style>
+          <a:lnRef idx="2">
+            <a:schemeClr val="accent5"/>
+          </a:lnRef>
+          <a:fillRef idx="1">
+            <a:schemeClr val="lt1"/>
+          </a:fillRef>
+          <a:effectRef idx="0">
+            <a:schemeClr val="accent5"/>
+          </a:effectRef>
+          <a:fontRef idx="minor">
+            <a:schemeClr val="dk1"/>
+          </a:fontRef>
+        </p:style>
+        <p:txBody>
+          <a:bodyPr rtlCol="0" anchor="ctr"/>
+          <a:lstStyle/>
+          <a:p>
+            <a:pPr algn="ctr"/>
+            <a:endParaRPr lang="en-US" altLang="ko-KR" dirty="0" smtClean="0"/>
+          </a:p>
+          <a:p>
+            <a:pPr algn="ctr"/>
+            <a:endParaRPr lang="en-US" altLang="ko-KR" dirty="0"/>
+          </a:p>
+          <a:p>
+            <a:pPr algn="ctr"/>
+            <a:endParaRPr lang="en-US" altLang="ko-KR" dirty="0" smtClean="0"/>
+          </a:p>
+          <a:p>
+            <a:pPr algn="ctr"/>
+            <a:endParaRPr lang="en-US" altLang="ko-KR" dirty="0"/>
+          </a:p>
+          <a:p>
+            <a:pPr algn="ctr"/>
+            <a:endParaRPr lang="en-US" altLang="ko-KR" dirty="0" smtClean="0"/>
+          </a:p>
+          <a:p>
+            <a:pPr algn="ctr"/>
+            <a:r>
+              <a:rPr lang="en-US" altLang="ko-KR" dirty="0" smtClean="0"/>
+              <a:t>(</a:t>
+            </a:r>
+            <a:r>
+              <a:rPr lang="ko-KR" altLang="en-US" dirty="0" smtClean="0"/>
+              <a:t>그림</a:t>
+            </a:r>
+            <a:r>
+              <a:rPr lang="en-US" altLang="ko-KR" dirty="0" smtClean="0"/>
+              <a:t>)</a:t>
+            </a:r>
+            <a:endParaRPr lang="en-US" altLang="ko-KR" dirty="0"/>
+          </a:p>
+          <a:p>
+            <a:pPr algn="ctr"/>
+            <a:endParaRPr lang="en-US" altLang="ko-KR" dirty="0" smtClean="0"/>
+          </a:p>
+          <a:p>
+            <a:pPr algn="ctr"/>
+            <a:r>
+              <a:rPr lang="ko-KR" altLang="en-US" dirty="0" err="1" smtClean="0"/>
+              <a:t>빨간맛</a:t>
+            </a:r>
+            <a:endParaRPr lang="en-US" altLang="ko-KR" dirty="0"/>
+          </a:p>
+          <a:p>
+            <a:pPr algn="ctr"/>
+            <a:r>
+              <a:rPr lang="ko-KR" altLang="en-US" dirty="0" smtClean="0"/>
+              <a:t>난이도</a:t>
+            </a:r>
+            <a:endParaRPr lang="ko-KR" altLang="en-US" dirty="0"/>
+          </a:p>
+        </p:txBody>
+      </p:sp>
+      <p:sp>
+        <p:nvSpPr>
+          <p:cNvPr id="4" name="직사각형 3"/>
+          <p:cNvSpPr/>
+          <p:nvPr/>
+        </p:nvSpPr>
+        <p:spPr>
+          <a:xfrm>
+            <a:off x="113120" y="1932494"/>
+            <a:ext cx="2884602" cy="2978869"/>
+          </a:xfrm>
+          <a:prstGeom prst="rect">
+            <a:avLst/>
+          </a:prstGeom>
+          <a:gradFill flip="none" rotWithShape="1">
+            <a:gsLst>
+              <a:gs pos="0">
+                <a:schemeClr val="lt1">
+                  <a:shade val="30000"/>
+                  <a:satMod val="115000"/>
+                </a:schemeClr>
+              </a:gs>
+              <a:gs pos="50000">
+                <a:schemeClr val="lt1">
+                  <a:shade val="67500"/>
+                  <a:satMod val="115000"/>
+                </a:schemeClr>
+              </a:gs>
+              <a:gs pos="100000">
+                <a:schemeClr val="lt1">
+                  <a:shade val="100000"/>
+                  <a:satMod val="115000"/>
+                </a:schemeClr>
+              </a:gs>
+            </a:gsLst>
+            <a:path path="circle">
+              <a:fillToRect l="50000" t="50000" r="50000" b="50000"/>
+            </a:path>
+            <a:tileRect/>
+          </a:gradFill>
+          <a:ln>
+            <a:prstDash val="dash"/>
+          </a:ln>
+        </p:spPr>
+        <p:style>
+          <a:lnRef idx="2">
+            <a:schemeClr val="accent5"/>
+          </a:lnRef>
+          <a:fillRef idx="1">
+            <a:schemeClr val="lt1"/>
+          </a:fillRef>
+          <a:effectRef idx="0">
+            <a:schemeClr val="accent5"/>
+          </a:effectRef>
+          <a:fontRef idx="minor">
+            <a:schemeClr val="dk1"/>
+          </a:fontRef>
+        </p:style>
+        <p:txBody>
+          <a:bodyPr rtlCol="0" anchor="ctr"/>
+          <a:lstStyle/>
+          <a:p>
+            <a:pPr algn="ctr"/>
+            <a:endParaRPr lang="en-US" altLang="ko-KR" dirty="0" smtClean="0"/>
+          </a:p>
+          <a:p>
+            <a:pPr algn="ctr"/>
+            <a:endParaRPr lang="en-US" altLang="ko-KR" dirty="0"/>
+          </a:p>
+          <a:p>
+            <a:pPr algn="ctr"/>
+            <a:endParaRPr lang="en-US" altLang="ko-KR" dirty="0" smtClean="0"/>
+          </a:p>
+          <a:p>
+            <a:pPr algn="ctr"/>
+            <a:endParaRPr lang="en-US" altLang="ko-KR" dirty="0"/>
+          </a:p>
+          <a:p>
+            <a:pPr algn="ctr"/>
+            <a:endParaRPr lang="en-US" altLang="ko-KR" dirty="0" smtClean="0"/>
+          </a:p>
+          <a:p>
+            <a:pPr algn="ctr"/>
+            <a:r>
+              <a:rPr lang="en-US" altLang="ko-KR" dirty="0" smtClean="0"/>
+              <a:t>(</a:t>
+            </a:r>
+            <a:r>
+              <a:rPr lang="ko-KR" altLang="en-US" dirty="0" smtClean="0"/>
+              <a:t>그림</a:t>
+            </a:r>
+            <a:r>
+              <a:rPr lang="en-US" altLang="ko-KR" dirty="0" smtClean="0"/>
+              <a:t>)</a:t>
+            </a:r>
+            <a:endParaRPr lang="en-US" altLang="ko-KR" dirty="0"/>
+          </a:p>
+          <a:p>
+            <a:pPr algn="ctr"/>
+            <a:endParaRPr lang="en-US" altLang="ko-KR" dirty="0" smtClean="0"/>
+          </a:p>
+          <a:p>
+            <a:pPr algn="ctr"/>
+            <a:r>
+              <a:rPr lang="ko-KR" altLang="en-US" dirty="0" smtClean="0"/>
+              <a:t>소우주</a:t>
+            </a:r>
+            <a:endParaRPr lang="en-US" altLang="ko-KR" dirty="0"/>
+          </a:p>
+          <a:p>
+            <a:pPr algn="ctr"/>
+            <a:r>
+              <a:rPr lang="ko-KR" altLang="en-US" dirty="0" smtClean="0"/>
+              <a:t>난이도</a:t>
+            </a:r>
+            <a:endParaRPr lang="ko-KR" altLang="en-US" dirty="0"/>
+          </a:p>
+        </p:txBody>
+      </p:sp>
+      <p:sp>
+        <p:nvSpPr>
+          <p:cNvPr id="5" name="직사각형 4"/>
+          <p:cNvSpPr/>
+          <p:nvPr/>
+        </p:nvSpPr>
+        <p:spPr>
+          <a:xfrm>
+            <a:off x="2790334" y="989815"/>
+            <a:ext cx="5948313" cy="4656841"/>
+          </a:xfrm>
+          <a:prstGeom prst="rect">
+            <a:avLst/>
+          </a:prstGeom>
+          <a:gradFill flip="none" rotWithShape="1">
+            <a:gsLst>
+              <a:gs pos="0">
+                <a:schemeClr val="lt1">
+                  <a:shade val="30000"/>
+                  <a:satMod val="115000"/>
+                </a:schemeClr>
+              </a:gs>
+              <a:gs pos="50000">
+                <a:schemeClr val="lt1">
+                  <a:shade val="67500"/>
+                  <a:satMod val="115000"/>
+                </a:schemeClr>
+              </a:gs>
+              <a:gs pos="100000">
+                <a:schemeClr val="lt1">
+                  <a:shade val="100000"/>
+                  <a:satMod val="115000"/>
+                </a:schemeClr>
+              </a:gs>
+            </a:gsLst>
+            <a:path path="circle">
+              <a:fillToRect l="50000" t="50000" r="50000" b="50000"/>
+            </a:path>
+            <a:tileRect/>
+          </a:gradFill>
+          <a:ln>
+            <a:prstDash val="dash"/>
+          </a:ln>
+        </p:spPr>
+        <p:style>
+          <a:lnRef idx="2">
+            <a:schemeClr val="accent5"/>
+          </a:lnRef>
+          <a:fillRef idx="1">
+            <a:schemeClr val="lt1"/>
+          </a:fillRef>
+          <a:effectRef idx="0">
+            <a:schemeClr val="accent5"/>
+          </a:effectRef>
+          <a:fontRef idx="minor">
+            <a:schemeClr val="dk1"/>
+          </a:fontRef>
+        </p:style>
+        <p:txBody>
+          <a:bodyPr rtlCol="0" anchor="ctr"/>
+          <a:lstStyle/>
+          <a:p>
+            <a:pPr algn="ctr"/>
+            <a:endParaRPr lang="en-US" altLang="ko-KR" dirty="0" smtClean="0"/>
+          </a:p>
+          <a:p>
+            <a:pPr algn="ctr"/>
+            <a:endParaRPr lang="en-US" altLang="ko-KR" dirty="0"/>
+          </a:p>
+          <a:p>
+            <a:pPr algn="ctr"/>
+            <a:endParaRPr lang="en-US" altLang="ko-KR" dirty="0" smtClean="0"/>
+          </a:p>
+          <a:p>
+            <a:pPr algn="ctr"/>
+            <a:endParaRPr lang="en-US" altLang="ko-KR" dirty="0"/>
+          </a:p>
+          <a:p>
+            <a:pPr algn="ctr"/>
+            <a:endParaRPr lang="en-US" altLang="ko-KR" dirty="0" smtClean="0"/>
+          </a:p>
+          <a:p>
+            <a:pPr algn="ctr"/>
+            <a:r>
+              <a:rPr lang="en-US" altLang="ko-KR" dirty="0" smtClean="0"/>
+              <a:t>(</a:t>
+            </a:r>
+            <a:r>
+              <a:rPr lang="ko-KR" altLang="en-US" dirty="0" smtClean="0"/>
+              <a:t>그림</a:t>
+            </a:r>
+            <a:r>
+              <a:rPr lang="en-US" altLang="ko-KR" dirty="0" smtClean="0"/>
+              <a:t>)</a:t>
+            </a:r>
+            <a:endParaRPr lang="en-US" altLang="ko-KR" dirty="0"/>
+          </a:p>
+          <a:p>
+            <a:pPr algn="ctr"/>
+            <a:endParaRPr lang="en-US" altLang="ko-KR" dirty="0" smtClean="0"/>
+          </a:p>
+          <a:p>
+            <a:pPr algn="ctr"/>
+            <a:endParaRPr lang="en-US" altLang="ko-KR" dirty="0"/>
+          </a:p>
+          <a:p>
+            <a:pPr algn="ctr"/>
+            <a:endParaRPr lang="en-US" altLang="ko-KR" dirty="0" smtClean="0"/>
+          </a:p>
+          <a:p>
+            <a:pPr algn="ctr"/>
+            <a:endParaRPr lang="en-US" altLang="ko-KR" dirty="0"/>
+          </a:p>
+          <a:p>
+            <a:pPr algn="ctr"/>
+            <a:endParaRPr lang="en-US" altLang="ko-KR" dirty="0" smtClean="0"/>
+          </a:p>
+          <a:p>
+            <a:pPr algn="ctr"/>
+            <a:r>
+              <a:rPr lang="ko-KR" altLang="en-US" dirty="0" err="1" smtClean="0"/>
+              <a:t>강남스타일</a:t>
+            </a:r>
+            <a:endParaRPr lang="en-US" altLang="ko-KR" dirty="0" smtClean="0"/>
+          </a:p>
+          <a:p>
+            <a:pPr algn="ctr"/>
+            <a:endParaRPr lang="en-US" altLang="ko-KR" dirty="0"/>
+          </a:p>
+          <a:p>
+            <a:pPr algn="ctr"/>
+            <a:r>
+              <a:rPr lang="ko-KR" altLang="en-US" dirty="0" smtClean="0"/>
+              <a:t>난이도</a:t>
+            </a:r>
+            <a:endParaRPr lang="ko-KR" altLang="en-US" dirty="0"/>
+          </a:p>
+        </p:txBody>
+      </p:sp>
+      <p:sp>
+        <p:nvSpPr>
+          <p:cNvPr id="6" name="타원 5"/>
+          <p:cNvSpPr/>
+          <p:nvPr/>
+        </p:nvSpPr>
+        <p:spPr>
+          <a:xfrm>
+            <a:off x="5241304" y="5646656"/>
+            <a:ext cx="1272618" cy="1102936"/>
+          </a:xfrm>
+          <a:prstGeom prst="ellipse">
+            <a:avLst/>
+          </a:prstGeom>
+        </p:spPr>
+        <p:style>
+          <a:lnRef idx="2">
+            <a:schemeClr val="accent1">
+              <a:shade val="50000"/>
+            </a:schemeClr>
+          </a:lnRef>
+          <a:fillRef idx="1">
+            <a:schemeClr val="accent1"/>
+          </a:fillRef>
+          <a:effectRef idx="0">
+            <a:schemeClr val="accent1"/>
+          </a:effectRef>
+          <a:fontRef idx="minor">
+            <a:schemeClr val="lt1"/>
+          </a:fontRef>
+        </p:style>
+        <p:txBody>
+          <a:bodyPr rot="0" spcFirstLastPara="0" vertOverflow="overflow" horzOverflow="overflow" vert="horz" wrap="square" lIns="91440" tIns="45720" rIns="91440" bIns="45720" numCol="1" spcCol="0" rtlCol="0" fromWordArt="0" anchor="ctr" anchorCtr="0" forceAA="0" compatLnSpc="1">
+            <a:prstTxWarp prst="textNoShape">
+              <a:avLst/>
+            </a:prstTxWarp>
+            <a:noAutofit/>
+          </a:bodyPr>
+          <a:lstStyle/>
+          <a:p>
+            <a:pPr algn="ctr"/>
+            <a:endParaRPr lang="ko-KR" altLang="en-US"/>
+          </a:p>
+        </p:txBody>
+      </p:sp>
+      <p:sp>
+        <p:nvSpPr>
+          <p:cNvPr id="7" name="이등변 삼각형 6"/>
+          <p:cNvSpPr/>
+          <p:nvPr/>
+        </p:nvSpPr>
+        <p:spPr>
+          <a:xfrm rot="5400000">
+            <a:off x="5627802" y="5825766"/>
+            <a:ext cx="725864" cy="772998"/>
+          </a:xfrm>
+          <a:prstGeom prst="triangle">
+            <a:avLst/>
+          </a:prstGeom>
+          <a:solidFill>
+            <a:schemeClr val="accent2"/>
+          </a:solidFill>
+        </p:spPr>
+        <p:style>
+          <a:lnRef idx="2">
+            <a:schemeClr val="accent1">
+              <a:shade val="50000"/>
+            </a:schemeClr>
+          </a:lnRef>
+          <a:fillRef idx="1">
+            <a:schemeClr val="accent1"/>
+          </a:fillRef>
+          <a:effectRef idx="0">
+            <a:schemeClr val="accent1"/>
+          </a:effectRef>
+          <a:fontRef idx="minor">
+            <a:schemeClr val="lt1"/>
+          </a:fontRef>
+        </p:style>
+        <p:txBody>
+          <a:bodyPr rot="0" spcFirstLastPara="0" vertOverflow="overflow" horzOverflow="overflow" vert="horz" wrap="square" lIns="91440" tIns="45720" rIns="91440" bIns="45720" numCol="1" spcCol="0" rtlCol="0" fromWordArt="0" anchor="ctr" anchorCtr="0" forceAA="0" compatLnSpc="1">
+            <a:prstTxWarp prst="textNoShape">
+              <a:avLst/>
+            </a:prstTxWarp>
+            <a:noAutofit/>
+          </a:bodyPr>
+          <a:lstStyle/>
+          <a:p>
+            <a:pPr algn="ctr"/>
+            <a:endParaRPr lang="ko-KR" altLang="en-US"/>
+          </a:p>
+        </p:txBody>
+      </p:sp>
+      <p:sp>
+        <p:nvSpPr>
+          <p:cNvPr id="8" name="오른쪽 화살표 7"/>
+          <p:cNvSpPr/>
+          <p:nvPr/>
+        </p:nvSpPr>
+        <p:spPr>
+          <a:xfrm>
+            <a:off x="9615340" y="5646656"/>
+            <a:ext cx="1621411" cy="1036948"/>
+          </a:xfrm>
+          <a:prstGeom prst="rightArrow">
+            <a:avLst/>
+          </a:prstGeom>
+        </p:spPr>
+        <p:style>
+          <a:lnRef idx="2">
+            <a:schemeClr val="accent1">
+              <a:shade val="50000"/>
+            </a:schemeClr>
+          </a:lnRef>
+          <a:fillRef idx="1">
+            <a:schemeClr val="accent1"/>
+          </a:fillRef>
+          <a:effectRef idx="0">
+            <a:schemeClr val="accent1"/>
+          </a:effectRef>
+          <a:fontRef idx="minor">
+            <a:schemeClr val="lt1"/>
+          </a:fontRef>
+        </p:style>
+        <p:txBody>
+          <a:bodyPr rot="0" spcFirstLastPara="0" vertOverflow="overflow" horzOverflow="overflow" vert="horz" wrap="square" lIns="91440" tIns="45720" rIns="91440" bIns="45720" numCol="1" spcCol="0" rtlCol="0" fromWordArt="0" anchor="ctr" anchorCtr="0" forceAA="0" compatLnSpc="1">
+            <a:prstTxWarp prst="textNoShape">
+              <a:avLst/>
+            </a:prstTxWarp>
+            <a:noAutofit/>
+          </a:bodyPr>
+          <a:lstStyle/>
+          <a:p>
+            <a:pPr algn="ctr"/>
+            <a:endParaRPr lang="ko-KR" altLang="en-US"/>
+          </a:p>
+        </p:txBody>
+      </p:sp>
+      <p:sp>
+        <p:nvSpPr>
+          <p:cNvPr id="9" name="오른쪽 화살표 8"/>
+          <p:cNvSpPr/>
+          <p:nvPr/>
+        </p:nvSpPr>
+        <p:spPr>
+          <a:xfrm rot="10800000">
+            <a:off x="641022" y="5538249"/>
+            <a:ext cx="1621411" cy="1036948"/>
+          </a:xfrm>
+          <a:prstGeom prst="rightArrow">
+            <a:avLst/>
+          </a:prstGeom>
+        </p:spPr>
+        <p:style>
+          <a:lnRef idx="2">
+            <a:schemeClr val="accent1">
+              <a:shade val="50000"/>
+            </a:schemeClr>
+          </a:lnRef>
+          <a:fillRef idx="1">
+            <a:schemeClr val="accent1"/>
+          </a:fillRef>
+          <a:effectRef idx="0">
+            <a:schemeClr val="accent1"/>
+          </a:effectRef>
+          <a:fontRef idx="minor">
+            <a:schemeClr val="lt1"/>
+          </a:fontRef>
+        </p:style>
+        <p:txBody>
+          <a:bodyPr rot="0" spcFirstLastPara="0" vertOverflow="overflow" horzOverflow="overflow" vert="horz" wrap="square" lIns="91440" tIns="45720" rIns="91440" bIns="45720" numCol="1" spcCol="0" rtlCol="0" fromWordArt="0" anchor="ctr" anchorCtr="0" forceAA="0" compatLnSpc="1">
+            <a:prstTxWarp prst="textNoShape">
+              <a:avLst/>
+            </a:prstTxWarp>
+            <a:noAutofit/>
+          </a:bodyPr>
+          <a:lstStyle/>
+          <a:p>
+            <a:pPr algn="ctr"/>
+            <a:endParaRPr lang="ko-KR" altLang="en-US"/>
+          </a:p>
+        </p:txBody>
+      </p:sp>
+      <p:sp>
+        <p:nvSpPr>
+          <p:cNvPr id="10" name="대각선 방향의 모서리가 잘린 사각형 9"/>
+          <p:cNvSpPr/>
+          <p:nvPr/>
+        </p:nvSpPr>
+        <p:spPr>
+          <a:xfrm>
+            <a:off x="374754" y="149902"/>
+            <a:ext cx="3972394" cy="462840"/>
+          </a:xfrm>
+          <a:prstGeom prst="snip2DiagRect">
+            <a:avLst/>
+          </a:prstGeom>
+          <a:solidFill>
+            <a:schemeClr val="tx1"/>
+          </a:solidFill>
+        </p:spPr>
+        <p:style>
+          <a:lnRef idx="2">
+            <a:schemeClr val="accent1">
+              <a:shade val="50000"/>
+            </a:schemeClr>
+          </a:lnRef>
+          <a:fillRef idx="1">
+            <a:schemeClr val="accent1"/>
+          </a:fillRef>
+          <a:effectRef idx="0">
+            <a:schemeClr val="accent1"/>
+          </a:effectRef>
+          <a:fontRef idx="minor">
+            <a:schemeClr val="lt1"/>
+          </a:fontRef>
+        </p:style>
+        <p:txBody>
+          <a:bodyPr rtlCol="0" anchor="ctr"/>
+          <a:lstStyle/>
+          <a:p>
+            <a:pPr algn="ctr"/>
+            <a:r>
+              <a:rPr lang="ko-KR" altLang="en-US" err="1" smtClean="0"/>
+              <a:t>노래화면</a:t>
+            </a:r>
+            <a:r>
+              <a:rPr lang="ko-KR" altLang="en-US" dirty="0" smtClean="0"/>
+              <a:t> </a:t>
+            </a:r>
+            <a:r>
+              <a:rPr lang="en-US" altLang="ko-KR" dirty="0" smtClean="0"/>
+              <a:t>- </a:t>
+            </a:r>
+            <a:r>
+              <a:rPr lang="ko-KR" altLang="en-US" dirty="0" err="1" smtClean="0"/>
+              <a:t>신태형</a:t>
+            </a:r>
+            <a:endParaRPr lang="ko-KR" altLang="en-US" dirty="0"/>
+          </a:p>
+        </p:txBody>
+      </p:sp>
+    </p:spTree>
+    <p:extLst>
+      <p:ext uri="{BB962C8B-B14F-4D97-AF65-F5344CB8AC3E}">
+        <p14:creationId xmlns:p14="http://schemas.microsoft.com/office/powerpoint/2010/main" val="3137658703"/>
+      </p:ext>
+    </p:extLst>
+  </p:cSld>
+  <p:clrMapOvr>
+    <a:masterClrMapping/>
+  </p:clrMapOvr>
 </p:sld>
 </file>
 

</xml_diff>